<commit_message>
added docs for volcano
</commit_message>
<xml_diff>
--- a/docs/cheatsheet/Pandas_Pandomics_Cheat_Sheet.pptx
+++ b/docs/cheatsheet/Pandas_Pandomics_Cheat_Sheet.pptx
@@ -256,7 +256,7 @@
           <a:p>
             <a:fld id="{79278B33-2949-49BE-B3B0-3F16CAF906FE}" type="datetimeFigureOut">
               <a:rPr lang="en-US" smtClean="0"/>
-              <a:t>3/17/2018</a:t>
+              <a:t>3/18/2018</a:t>
             </a:fld>
             <a:endParaRPr lang="en-US"/>
           </a:p>
@@ -426,7 +426,7 @@
           <a:p>
             <a:fld id="{79278B33-2949-49BE-B3B0-3F16CAF906FE}" type="datetimeFigureOut">
               <a:rPr lang="en-US" smtClean="0"/>
-              <a:t>3/17/2018</a:t>
+              <a:t>3/18/2018</a:t>
             </a:fld>
             <a:endParaRPr lang="en-US"/>
           </a:p>
@@ -606,7 +606,7 @@
           <a:p>
             <a:fld id="{79278B33-2949-49BE-B3B0-3F16CAF906FE}" type="datetimeFigureOut">
               <a:rPr lang="en-US" smtClean="0"/>
-              <a:t>3/17/2018</a:t>
+              <a:t>3/18/2018</a:t>
             </a:fld>
             <a:endParaRPr lang="en-US"/>
           </a:p>
@@ -776,7 +776,7 @@
           <a:p>
             <a:fld id="{79278B33-2949-49BE-B3B0-3F16CAF906FE}" type="datetimeFigureOut">
               <a:rPr lang="en-US" smtClean="0"/>
-              <a:t>3/17/2018</a:t>
+              <a:t>3/18/2018</a:t>
             </a:fld>
             <a:endParaRPr lang="en-US"/>
           </a:p>
@@ -1020,7 +1020,7 @@
           <a:p>
             <a:fld id="{79278B33-2949-49BE-B3B0-3F16CAF906FE}" type="datetimeFigureOut">
               <a:rPr lang="en-US" smtClean="0"/>
-              <a:t>3/17/2018</a:t>
+              <a:t>3/18/2018</a:t>
             </a:fld>
             <a:endParaRPr lang="en-US"/>
           </a:p>
@@ -1252,7 +1252,7 @@
           <a:p>
             <a:fld id="{79278B33-2949-49BE-B3B0-3F16CAF906FE}" type="datetimeFigureOut">
               <a:rPr lang="en-US" smtClean="0"/>
-              <a:t>3/17/2018</a:t>
+              <a:t>3/18/2018</a:t>
             </a:fld>
             <a:endParaRPr lang="en-US"/>
           </a:p>
@@ -1619,7 +1619,7 @@
           <a:p>
             <a:fld id="{79278B33-2949-49BE-B3B0-3F16CAF906FE}" type="datetimeFigureOut">
               <a:rPr lang="en-US" smtClean="0"/>
-              <a:t>3/17/2018</a:t>
+              <a:t>3/18/2018</a:t>
             </a:fld>
             <a:endParaRPr lang="en-US"/>
           </a:p>
@@ -1737,7 +1737,7 @@
           <a:p>
             <a:fld id="{79278B33-2949-49BE-B3B0-3F16CAF906FE}" type="datetimeFigureOut">
               <a:rPr lang="en-US" smtClean="0"/>
-              <a:t>3/17/2018</a:t>
+              <a:t>3/18/2018</a:t>
             </a:fld>
             <a:endParaRPr lang="en-US"/>
           </a:p>
@@ -1832,7 +1832,7 @@
           <a:p>
             <a:fld id="{79278B33-2949-49BE-B3B0-3F16CAF906FE}" type="datetimeFigureOut">
               <a:rPr lang="en-US" smtClean="0"/>
-              <a:t>3/17/2018</a:t>
+              <a:t>3/18/2018</a:t>
             </a:fld>
             <a:endParaRPr lang="en-US"/>
           </a:p>
@@ -2109,7 +2109,7 @@
           <a:p>
             <a:fld id="{79278B33-2949-49BE-B3B0-3F16CAF906FE}" type="datetimeFigureOut">
               <a:rPr lang="en-US" smtClean="0"/>
-              <a:t>3/17/2018</a:t>
+              <a:t>3/18/2018</a:t>
             </a:fld>
             <a:endParaRPr lang="en-US"/>
           </a:p>
@@ -2366,7 +2366,7 @@
           <a:p>
             <a:fld id="{79278B33-2949-49BE-B3B0-3F16CAF906FE}" type="datetimeFigureOut">
               <a:rPr lang="en-US" smtClean="0"/>
-              <a:t>3/17/2018</a:t>
+              <a:t>3/18/2018</a:t>
             </a:fld>
             <a:endParaRPr lang="en-US"/>
           </a:p>
@@ -2579,7 +2579,7 @@
           <a:p>
             <a:fld id="{79278B33-2949-49BE-B3B0-3F16CAF906FE}" type="datetimeFigureOut">
               <a:rPr lang="en-US" smtClean="0"/>
-              <a:t>3/17/2018</a:t>
+              <a:t>3/18/2018</a:t>
             </a:fld>
             <a:endParaRPr lang="en-US"/>
           </a:p>
@@ -11333,14 +11333,14 @@
           <a:effectLst/>
           <a:extLst>
             <a:ext uri="{909E8E84-426E-40dd-AFC4-6F175D3DCCD1}">
-              <a14:hiddenFill xmlns:a14="http://schemas.microsoft.com/office/drawing/2010/main" xmlns="">
+              <a14:hiddenFill xmlns="" xmlns:a14="http://schemas.microsoft.com/office/drawing/2010/main">
                 <a:solidFill>
                   <a:schemeClr val="accent1"/>
                 </a:solidFill>
               </a14:hiddenFill>
             </a:ext>
             <a:ext uri="{91240B29-F687-4f45-9708-019B960494DF}">
-              <a14:hiddenLine xmlns:a14="http://schemas.microsoft.com/office/drawing/2010/main" xmlns="" w="9525">
+              <a14:hiddenLine xmlns="" xmlns:a14="http://schemas.microsoft.com/office/drawing/2010/main" w="9525">
                 <a:solidFill>
                   <a:schemeClr val="tx1"/>
                 </a:solidFill>
@@ -11350,7 +11350,7 @@
               </a14:hiddenLine>
             </a:ext>
             <a:ext uri="{AF507438-7753-43e0-B8FC-AC1667EBCBE1}">
-              <a14:hiddenEffects xmlns:a14="http://schemas.microsoft.com/office/drawing/2010/main" xmlns="">
+              <a14:hiddenEffects xmlns="" xmlns:a14="http://schemas.microsoft.com/office/drawing/2010/main">
                 <a:effectLst>
                   <a:outerShdw dist="35921" dir="2700000" algn="ctr" rotWithShape="0">
                     <a:schemeClr val="bg2"/>
@@ -26887,8 +26887,8 @@
         </p:nvSpPr>
         <p:spPr>
           <a:xfrm>
-            <a:off x="207918" y="3248814"/>
-            <a:ext cx="2326551" cy="2123658"/>
+            <a:off x="2469119" y="796091"/>
+            <a:ext cx="2326551" cy="1569660"/>
           </a:xfrm>
           <a:prstGeom prst="rect">
             <a:avLst/>
@@ -26902,90 +26902,74 @@
           <a:lstStyle/>
           <a:p>
             <a:r>
+              <a:rPr lang="en-US" sz="1200" b="1" dirty="0" err="1">
+                <a:latin typeface="Consolas" panose="020B0609020204030204" pitchFamily="49" charset="0"/>
+              </a:rPr>
+              <a:t>first_member</a:t>
+            </a:r>
+            <a:r>
               <a:rPr lang="en-US" sz="1200" b="1" dirty="0">
                 <a:latin typeface="Consolas" panose="020B0609020204030204" pitchFamily="49" charset="0"/>
               </a:rPr>
-              <a:t>sum()</a:t>
+              <a:t>(</a:t>
+            </a:r>
+            <a:r>
+              <a:rPr lang="en-US" sz="1200" b="1" dirty="0" err="1">
+                <a:latin typeface="Consolas" panose="020B0609020204030204" pitchFamily="49" charset="0"/>
+              </a:rPr>
+              <a:t>delim</a:t>
+            </a:r>
+            <a:r>
+              <a:rPr lang="en-US" sz="1200" b="1" dirty="0">
+                <a:latin typeface="Consolas" panose="020B0609020204030204" pitchFamily="49" charset="0"/>
+              </a:rPr>
+              <a:t>=‘;’)</a:t>
             </a:r>
           </a:p>
           <a:p>
             <a:pPr marL="111125"/>
             <a:r>
               <a:rPr lang="en-US" sz="1200" dirty="0"/>
-              <a:t>Sum values of each object.</a:t>
-            </a:r>
+              <a:t>Take the first member of a </a:t>
+            </a:r>
+            <a:r>
+              <a:rPr lang="en-US" sz="1200" dirty="0" err="1"/>
+              <a:t>stringified</a:t>
+            </a:r>
+            <a:r>
+              <a:rPr lang="en-US" sz="1200" dirty="0"/>
+              <a:t> list delimited by  a given </a:t>
+            </a:r>
+            <a:r>
+              <a:rPr lang="en-US" sz="1200" dirty="0" err="1"/>
+              <a:t>delim</a:t>
+            </a:r>
+            <a:r>
+              <a:rPr lang="en-US" sz="1200" dirty="0"/>
+              <a:t>. </a:t>
+            </a:r>
+          </a:p>
+          <a:p>
+            <a:pPr marL="111125"/>
+            <a:endParaRPr lang="en-US" sz="1200" dirty="0"/>
           </a:p>
           <a:p>
             <a:r>
               <a:rPr lang="en-US" sz="1200" b="1" dirty="0">
                 <a:latin typeface="Consolas" panose="020B0609020204030204" pitchFamily="49" charset="0"/>
               </a:rPr>
-              <a:t>count()</a:t>
+              <a:t>placeholder()</a:t>
             </a:r>
           </a:p>
           <a:p>
             <a:pPr marL="111125"/>
             <a:r>
               <a:rPr lang="en-US" sz="1200" dirty="0"/>
-              <a:t>Count non-NA/null values of each object.</a:t>
-            </a:r>
-          </a:p>
-          <a:p>
-            <a:r>
-              <a:rPr lang="en-US" sz="1200" b="1" dirty="0">
-                <a:latin typeface="Consolas" panose="020B0609020204030204" pitchFamily="49" charset="0"/>
-              </a:rPr>
-              <a:t>median()</a:t>
-            </a:r>
-          </a:p>
-          <a:p>
-            <a:pPr marL="111125"/>
-            <a:r>
-              <a:rPr lang="en-US" sz="1200" dirty="0"/>
-              <a:t>Median value of each object.</a:t>
-            </a:r>
-          </a:p>
-          <a:p>
-            <a:r>
-              <a:rPr lang="en-US" sz="1200" b="1" dirty="0">
-                <a:latin typeface="Consolas" panose="020B0609020204030204" pitchFamily="49" charset="0"/>
-              </a:rPr>
-              <a:t>quantile([0.25,0.75])</a:t>
-            </a:r>
-          </a:p>
-          <a:p>
-            <a:pPr marL="111125"/>
-            <a:r>
-              <a:rPr lang="en-US" sz="1200" dirty="0"/>
-              <a:t>Quantiles of each object.</a:t>
-            </a:r>
-          </a:p>
-          <a:p>
-            <a:r>
-              <a:rPr lang="en-US" sz="1200" b="1" dirty="0">
-                <a:latin typeface="Consolas" panose="020B0609020204030204" pitchFamily="49" charset="0"/>
-              </a:rPr>
-              <a:t>apply(</a:t>
-            </a:r>
-            <a:r>
-              <a:rPr lang="en-US" sz="1200" b="1" i="1" dirty="0">
-                <a:latin typeface="Consolas" panose="020B0609020204030204" pitchFamily="49" charset="0"/>
-              </a:rPr>
-              <a:t>function</a:t>
-            </a:r>
-            <a:r>
-              <a:rPr lang="en-US" sz="1200" b="1" dirty="0">
-                <a:latin typeface="Consolas" panose="020B0609020204030204" pitchFamily="49" charset="0"/>
-              </a:rPr>
-              <a:t>)</a:t>
-            </a:r>
-          </a:p>
-          <a:p>
-            <a:pPr marL="111125"/>
-            <a:r>
-              <a:rPr lang="en-US" sz="1200" dirty="0"/>
-              <a:t>Apply function to each object.</a:t>
-            </a:r>
+              <a:t>Placeholder.</a:t>
+            </a:r>
+          </a:p>
+          <a:p>
+            <a:endParaRPr lang="en-US" sz="1200" dirty="0"/>
           </a:p>
         </p:txBody>
       </p:sp>
@@ -26997,8 +26981,8 @@
         </p:nvSpPr>
         <p:spPr>
           <a:xfrm>
-            <a:off x="2352893" y="3248814"/>
-            <a:ext cx="2299706" cy="2123658"/>
+            <a:off x="169413" y="746877"/>
+            <a:ext cx="2299706" cy="3600986"/>
           </a:xfrm>
           <a:prstGeom prst="rect">
             <a:avLst/>
@@ -27015,52 +26999,86 @@
               <a:rPr lang="en-US" sz="1200" b="1" dirty="0">
                 <a:latin typeface="Consolas" panose="020B0609020204030204" pitchFamily="49" charset="0"/>
               </a:rPr>
-              <a:t>min()</a:t>
+              <a:t>log2()</a:t>
             </a:r>
           </a:p>
           <a:p>
             <a:pPr marL="111125"/>
             <a:r>
               <a:rPr lang="en-US" sz="1200" dirty="0"/>
-              <a:t>Minimum value in each object.</a:t>
-            </a:r>
+              <a:t>Take the log2 of each items in a </a:t>
+            </a:r>
+            <a:r>
+              <a:rPr lang="en-US" sz="1200" dirty="0" err="1"/>
+              <a:t>DataFrame</a:t>
+            </a:r>
+            <a:endParaRPr lang="en-US" sz="1200" dirty="0"/>
+          </a:p>
+          <a:p>
+            <a:endParaRPr lang="en-US" sz="1200" b="1" dirty="0">
+              <a:latin typeface="Consolas" panose="020B0609020204030204" pitchFamily="49" charset="0"/>
+            </a:endParaRPr>
           </a:p>
           <a:p>
             <a:r>
               <a:rPr lang="en-US" sz="1200" b="1" dirty="0">
                 <a:latin typeface="Consolas" panose="020B0609020204030204" pitchFamily="49" charset="0"/>
               </a:rPr>
-              <a:t>max()</a:t>
+              <a:t>log2_normalize()</a:t>
             </a:r>
           </a:p>
           <a:p>
             <a:pPr marL="111125"/>
             <a:r>
               <a:rPr lang="en-US" sz="1200" dirty="0"/>
-              <a:t>Maximum value in each object.</a:t>
-            </a:r>
-          </a:p>
-          <a:p>
+              <a:t>Take the log2() then subtract the mean of the  </a:t>
+            </a:r>
+          </a:p>
+          <a:p>
+            <a:endParaRPr lang="en-US" sz="1200" b="1" dirty="0">
+              <a:latin typeface="Consolas" panose="020B0609020204030204" pitchFamily="49" charset="0"/>
+            </a:endParaRPr>
+          </a:p>
+          <a:p>
+            <a:r>
+              <a:rPr lang="en-US" sz="1200" b="1" dirty="0" err="1">
+                <a:latin typeface="Consolas" panose="020B0609020204030204" pitchFamily="49" charset="0"/>
+              </a:rPr>
+              <a:t>normalization_factors</a:t>
+            </a:r>
             <a:r>
               <a:rPr lang="en-US" sz="1200" b="1" dirty="0">
                 <a:latin typeface="Consolas" panose="020B0609020204030204" pitchFamily="49" charset="0"/>
               </a:rPr>
-              <a:t>mean()</a:t>
+              <a:t>()</a:t>
             </a:r>
           </a:p>
           <a:p>
             <a:pPr marL="111125"/>
             <a:r>
               <a:rPr lang="en-US" sz="1200" dirty="0"/>
-              <a:t>Mean value of each object.</a:t>
-            </a:r>
+              <a:t>Compute normalization factors for a </a:t>
+            </a:r>
+            <a:r>
+              <a:rPr lang="en-US" sz="1200" dirty="0" err="1"/>
+              <a:t>DataFrame</a:t>
+            </a:r>
+            <a:r>
+              <a:rPr lang="en-US" sz="1200" dirty="0"/>
+              <a:t>.</a:t>
+            </a:r>
+          </a:p>
+          <a:p>
+            <a:endParaRPr lang="en-US" sz="1200" b="1" dirty="0">
+              <a:latin typeface="Consolas" panose="020B0609020204030204" pitchFamily="49" charset="0"/>
+            </a:endParaRPr>
           </a:p>
           <a:p>
             <a:r>
               <a:rPr lang="en-US" sz="1200" b="1" dirty="0" err="1">
                 <a:latin typeface="Consolas" panose="020B0609020204030204" pitchFamily="49" charset="0"/>
               </a:rPr>
-              <a:t>var</a:t>
+              <a:t>normalize_to</a:t>
             </a:r>
             <a:r>
               <a:rPr lang="en-US" sz="1200" b="1" dirty="0">
@@ -27073,15 +27091,35 @@
             <a:pPr marL="111125"/>
             <a:r>
               <a:rPr lang="en-US" sz="1200" dirty="0"/>
-              <a:t>Variance of each object.</a:t>
-            </a:r>
+              <a:t>Normalize a </a:t>
+            </a:r>
+            <a:r>
+              <a:rPr lang="en-US" sz="1200" dirty="0" err="1"/>
+              <a:t>DataFrame</a:t>
+            </a:r>
+            <a:r>
+              <a:rPr lang="en-US" sz="1200" dirty="0"/>
+              <a:t> to another </a:t>
+            </a:r>
+            <a:r>
+              <a:rPr lang="en-US" sz="1200" dirty="0" err="1"/>
+              <a:t>DataFrame</a:t>
+            </a:r>
+            <a:r>
+              <a:rPr lang="en-US" sz="1200" dirty="0"/>
+              <a:t>.</a:t>
+            </a:r>
+          </a:p>
+          <a:p>
+            <a:pPr marL="111125"/>
+            <a:endParaRPr lang="en-US" sz="1200" dirty="0"/>
           </a:p>
           <a:p>
             <a:r>
               <a:rPr lang="en-US" sz="1200" b="1" dirty="0" err="1">
                 <a:latin typeface="Consolas" panose="020B0609020204030204" pitchFamily="49" charset="0"/>
               </a:rPr>
-              <a:t>std</a:t>
+              <a:t>compare_to</a:t>
             </a:r>
             <a:r>
               <a:rPr lang="en-US" sz="1200" b="1" dirty="0">
@@ -31395,9 +31433,9 @@
           </a:stretch>
         </p:blipFill>
         <p:spPr>
-          <a:xfrm rot="5400000" flipV="1">
-            <a:off x="354989" y="911012"/>
-            <a:ext cx="863850" cy="854921"/>
+          <a:xfrm rot="10800000" flipV="1">
+            <a:off x="1134189" y="309346"/>
+            <a:ext cx="292749" cy="289723"/>
           </a:xfrm>
           <a:prstGeom prst="rect">
             <a:avLst/>

</xml_diff>